<commit_message>
Cleaned up a bit
</commit_message>
<xml_diff>
--- a/fig_coordtrans.pptx
+++ b/fig_coordtrans.pptx
@@ -123,15 +123,6 @@
 </p:presentation>
 </file>
 
-<file path=ppt/revisionInfo.xml><?xml version="1.0" encoding="utf-8"?>
-<p1510:revInfo xmlns:a="http://schemas.openxmlformats.org/drawingml/2006/main" xmlns:r="http://schemas.openxmlformats.org/officeDocument/2006/relationships" xmlns:p1510="http://schemas.microsoft.com/office/powerpoint/2015/10/main">
-  <p1510:revLst>
-    <p1510:client id="{7B240E68-553F-994D-927D-9E20778282F8}" v="50" dt="2025-05-06T03:48:10.691"/>
-    <p1510:client id="{F19F6765-F9C2-2F4B-B759-1DC0051C5417}" v="30" dt="2025-05-05T22:06:30.662"/>
-  </p1510:revLst>
-</p1510:revInfo>
-</file>
-
 <file path=ppt/changesInfos/changesInfo1.xml><?xml version="1.0" encoding="utf-8"?>
 <pc:chgInfo xmlns:a="http://schemas.openxmlformats.org/drawingml/2006/main" xmlns:r="http://schemas.openxmlformats.org/officeDocument/2006/relationships" xmlns:ac="http://schemas.microsoft.com/office/drawing/2013/main/command" xmlns:pc="http://schemas.microsoft.com/office/powerpoint/2013/main/command">
   <pc:docChgLst>
@@ -147,502 +138,6 @@
           <pc:docMk/>
           <pc:sldMk cId="1160241537" sldId="256"/>
         </pc:sldMkLst>
-        <pc:spChg chg="del">
-          <ac:chgData name="Barkasi, Michael" userId="604489e9-c8b5-4a18-ae0d-3a3e29c44efc" providerId="ADAL" clId="{F19F6765-F9C2-2F4B-B759-1DC0051C5417}" dt="2025-05-05T18:42:31.305" v="0" actId="478"/>
-          <ac:spMkLst>
-            <pc:docMk/>
-            <pc:sldMk cId="1160241537" sldId="256"/>
-            <ac:spMk id="17" creationId="{0ED99072-BE6C-C6ED-2867-FBA486153AC8}"/>
-          </ac:spMkLst>
-        </pc:spChg>
-        <pc:spChg chg="del">
-          <ac:chgData name="Barkasi, Michael" userId="604489e9-c8b5-4a18-ae0d-3a3e29c44efc" providerId="ADAL" clId="{F19F6765-F9C2-2F4B-B759-1DC0051C5417}" dt="2025-05-05T18:42:31.305" v="0" actId="478"/>
-          <ac:spMkLst>
-            <pc:docMk/>
-            <pc:sldMk cId="1160241537" sldId="256"/>
-            <ac:spMk id="18" creationId="{216C1992-1453-F5DF-D02F-A3FFD0F7D0E6}"/>
-          </ac:spMkLst>
-        </pc:spChg>
-        <pc:spChg chg="del">
-          <ac:chgData name="Barkasi, Michael" userId="604489e9-c8b5-4a18-ae0d-3a3e29c44efc" providerId="ADAL" clId="{F19F6765-F9C2-2F4B-B759-1DC0051C5417}" dt="2025-05-05T18:42:31.305" v="0" actId="478"/>
-          <ac:spMkLst>
-            <pc:docMk/>
-            <pc:sldMk cId="1160241537" sldId="256"/>
-            <ac:spMk id="20" creationId="{555A90AE-553C-0FBA-1AE8-DD3551B66644}"/>
-          </ac:spMkLst>
-        </pc:spChg>
-        <pc:spChg chg="mod">
-          <ac:chgData name="Barkasi, Michael" userId="604489e9-c8b5-4a18-ae0d-3a3e29c44efc" providerId="ADAL" clId="{F19F6765-F9C2-2F4B-B759-1DC0051C5417}" dt="2025-05-05T18:47:52.257" v="37" actId="2711"/>
-          <ac:spMkLst>
-            <pc:docMk/>
-            <pc:sldMk cId="1160241537" sldId="256"/>
-            <ac:spMk id="28" creationId="{EC1FBF5A-3333-E899-2543-90256C7B2DC0}"/>
-          </ac:spMkLst>
-        </pc:spChg>
-        <pc:spChg chg="mod topLvl">
-          <ac:chgData name="Barkasi, Michael" userId="604489e9-c8b5-4a18-ae0d-3a3e29c44efc" providerId="ADAL" clId="{F19F6765-F9C2-2F4B-B759-1DC0051C5417}" dt="2025-05-05T22:08:00.871" v="236" actId="1076"/>
-          <ac:spMkLst>
-            <pc:docMk/>
-            <pc:sldMk cId="1160241537" sldId="256"/>
-            <ac:spMk id="33" creationId="{6DD1B967-3B7C-B8E3-3AD9-127CC0BB85B5}"/>
-          </ac:spMkLst>
-        </pc:spChg>
-        <pc:spChg chg="del">
-          <ac:chgData name="Barkasi, Michael" userId="604489e9-c8b5-4a18-ae0d-3a3e29c44efc" providerId="ADAL" clId="{F19F6765-F9C2-2F4B-B759-1DC0051C5417}" dt="2025-05-05T18:42:31.305" v="0" actId="478"/>
-          <ac:spMkLst>
-            <pc:docMk/>
-            <pc:sldMk cId="1160241537" sldId="256"/>
-            <ac:spMk id="35" creationId="{173E1837-9B21-091E-CB95-51C6BA675180}"/>
-          </ac:spMkLst>
-        </pc:spChg>
-        <pc:spChg chg="add mod">
-          <ac:chgData name="Barkasi, Michael" userId="604489e9-c8b5-4a18-ae0d-3a3e29c44efc" providerId="ADAL" clId="{F19F6765-F9C2-2F4B-B759-1DC0051C5417}" dt="2025-05-05T22:08:00.871" v="236" actId="1076"/>
-          <ac:spMkLst>
-            <pc:docMk/>
-            <pc:sldMk cId="1160241537" sldId="256"/>
-            <ac:spMk id="41" creationId="{489C7890-2293-260F-927E-3A0BAF6AE31E}"/>
-          </ac:spMkLst>
-        </pc:spChg>
-        <pc:spChg chg="add mod">
-          <ac:chgData name="Barkasi, Michael" userId="604489e9-c8b5-4a18-ae0d-3a3e29c44efc" providerId="ADAL" clId="{F19F6765-F9C2-2F4B-B759-1DC0051C5417}" dt="2025-05-05T18:53:24.859" v="170" actId="1076"/>
-          <ac:spMkLst>
-            <pc:docMk/>
-            <pc:sldMk cId="1160241537" sldId="256"/>
-            <ac:spMk id="42" creationId="{BB15E696-D7E8-065F-22C9-1F1C225CBEE6}"/>
-          </ac:spMkLst>
-        </pc:spChg>
-        <pc:spChg chg="add mod">
-          <ac:chgData name="Barkasi, Michael" userId="604489e9-c8b5-4a18-ae0d-3a3e29c44efc" providerId="ADAL" clId="{F19F6765-F9C2-2F4B-B759-1DC0051C5417}" dt="2025-05-05T22:08:03.919" v="237" actId="1076"/>
-          <ac:spMkLst>
-            <pc:docMk/>
-            <pc:sldMk cId="1160241537" sldId="256"/>
-            <ac:spMk id="43" creationId="{CDC17340-8A6A-952F-C785-2381010C19BF}"/>
-          </ac:spMkLst>
-        </pc:spChg>
-        <pc:spChg chg="add mod">
-          <ac:chgData name="Barkasi, Michael" userId="604489e9-c8b5-4a18-ae0d-3a3e29c44efc" providerId="ADAL" clId="{F19F6765-F9C2-2F4B-B759-1DC0051C5417}" dt="2025-05-05T22:08:06.706" v="238" actId="1076"/>
-          <ac:spMkLst>
-            <pc:docMk/>
-            <pc:sldMk cId="1160241537" sldId="256"/>
-            <ac:spMk id="44" creationId="{71DEAC27-2EA9-F41D-4751-9DC0B3CBC65F}"/>
-          </ac:spMkLst>
-        </pc:spChg>
-        <pc:spChg chg="mod">
-          <ac:chgData name="Barkasi, Michael" userId="604489e9-c8b5-4a18-ae0d-3a3e29c44efc" providerId="ADAL" clId="{F19F6765-F9C2-2F4B-B759-1DC0051C5417}" dt="2025-05-05T18:49:45.753" v="78"/>
-          <ac:spMkLst>
-            <pc:docMk/>
-            <pc:sldMk cId="1160241537" sldId="256"/>
-            <ac:spMk id="53" creationId="{B62E7BC5-ECD8-C3BD-8852-44E3A483EA27}"/>
-          </ac:spMkLst>
-        </pc:spChg>
-        <pc:spChg chg="mod topLvl">
-          <ac:chgData name="Barkasi, Michael" userId="604489e9-c8b5-4a18-ae0d-3a3e29c44efc" providerId="ADAL" clId="{F19F6765-F9C2-2F4B-B759-1DC0051C5417}" dt="2025-05-05T18:52:21.998" v="110" actId="164"/>
-          <ac:spMkLst>
-            <pc:docMk/>
-            <pc:sldMk cId="1160241537" sldId="256"/>
-            <ac:spMk id="75" creationId="{D4FA8A0E-0BBD-D32F-54AE-54E7BD6C418D}"/>
-          </ac:spMkLst>
-        </pc:spChg>
-        <pc:spChg chg="del">
-          <ac:chgData name="Barkasi, Michael" userId="604489e9-c8b5-4a18-ae0d-3a3e29c44efc" providerId="ADAL" clId="{F19F6765-F9C2-2F4B-B759-1DC0051C5417}" dt="2025-05-05T18:42:31.305" v="0" actId="478"/>
-          <ac:spMkLst>
-            <pc:docMk/>
-            <pc:sldMk cId="1160241537" sldId="256"/>
-            <ac:spMk id="77" creationId="{BD84AEB1-6662-C56D-7E67-69415C00445B}"/>
-          </ac:spMkLst>
-        </pc:spChg>
-        <pc:spChg chg="add mod">
-          <ac:chgData name="Barkasi, Michael" userId="604489e9-c8b5-4a18-ae0d-3a3e29c44efc" providerId="ADAL" clId="{F19F6765-F9C2-2F4B-B759-1DC0051C5417}" dt="2025-05-05T18:53:09.134" v="157" actId="14100"/>
-          <ac:spMkLst>
-            <pc:docMk/>
-            <pc:sldMk cId="1160241537" sldId="256"/>
-            <ac:spMk id="102" creationId="{1A3C6997-4E40-38F4-EB1E-1C61067AAE9F}"/>
-          </ac:spMkLst>
-        </pc:spChg>
-        <pc:spChg chg="add mod">
-          <ac:chgData name="Barkasi, Michael" userId="604489e9-c8b5-4a18-ae0d-3a3e29c44efc" providerId="ADAL" clId="{F19F6765-F9C2-2F4B-B759-1DC0051C5417}" dt="2025-05-05T22:07:37.363" v="233" actId="1076"/>
-          <ac:spMkLst>
-            <pc:docMk/>
-            <pc:sldMk cId="1160241537" sldId="256"/>
-            <ac:spMk id="103" creationId="{74CFA3CB-217D-96DE-8D0B-AA3628379351}"/>
-          </ac:spMkLst>
-        </pc:spChg>
-        <pc:spChg chg="add mod">
-          <ac:chgData name="Barkasi, Michael" userId="604489e9-c8b5-4a18-ae0d-3a3e29c44efc" providerId="ADAL" clId="{F19F6765-F9C2-2F4B-B759-1DC0051C5417}" dt="2025-05-05T22:07:40.584" v="234" actId="1076"/>
-          <ac:spMkLst>
-            <pc:docMk/>
-            <pc:sldMk cId="1160241537" sldId="256"/>
-            <ac:spMk id="104" creationId="{B493F746-8314-8F87-5519-0151F9AFD43C}"/>
-          </ac:spMkLst>
-        </pc:spChg>
-        <pc:spChg chg="add mod">
-          <ac:chgData name="Barkasi, Michael" userId="604489e9-c8b5-4a18-ae0d-3a3e29c44efc" providerId="ADAL" clId="{F19F6765-F9C2-2F4B-B759-1DC0051C5417}" dt="2025-05-05T22:07:37.363" v="233" actId="1076"/>
-          <ac:spMkLst>
-            <pc:docMk/>
-            <pc:sldMk cId="1160241537" sldId="256"/>
-            <ac:spMk id="109" creationId="{C0CECDFC-29DC-9E49-F628-C98AF3712AF1}"/>
-          </ac:spMkLst>
-        </pc:spChg>
-        <pc:spChg chg="add mod">
-          <ac:chgData name="Barkasi, Michael" userId="604489e9-c8b5-4a18-ae0d-3a3e29c44efc" providerId="ADAL" clId="{F19F6765-F9C2-2F4B-B759-1DC0051C5417}" dt="2025-05-05T22:06:51.096" v="232" actId="1076"/>
-          <ac:spMkLst>
-            <pc:docMk/>
-            <pc:sldMk cId="1160241537" sldId="256"/>
-            <ac:spMk id="110" creationId="{DD6AAAD2-9A51-A203-8D3E-39A30D638981}"/>
-          </ac:spMkLst>
-        </pc:spChg>
-        <pc:spChg chg="del">
-          <ac:chgData name="Barkasi, Michael" userId="604489e9-c8b5-4a18-ae0d-3a3e29c44efc" providerId="ADAL" clId="{F19F6765-F9C2-2F4B-B759-1DC0051C5417}" dt="2025-05-05T18:42:31.305" v="0" actId="478"/>
-          <ac:spMkLst>
-            <pc:docMk/>
-            <pc:sldMk cId="1160241537" sldId="256"/>
-            <ac:spMk id="367" creationId="{F4C22F3B-FB9B-9308-09F3-2FB2B62FA620}"/>
-          </ac:spMkLst>
-        </pc:spChg>
-        <pc:spChg chg="del">
-          <ac:chgData name="Barkasi, Michael" userId="604489e9-c8b5-4a18-ae0d-3a3e29c44efc" providerId="ADAL" clId="{F19F6765-F9C2-2F4B-B759-1DC0051C5417}" dt="2025-05-05T18:42:31.305" v="0" actId="478"/>
-          <ac:spMkLst>
-            <pc:docMk/>
-            <pc:sldMk cId="1160241537" sldId="256"/>
-            <ac:spMk id="372" creationId="{D0BF1455-2E79-FFD7-87A9-61ADBC848FC6}"/>
-          </ac:spMkLst>
-        </pc:spChg>
-        <pc:spChg chg="del">
-          <ac:chgData name="Barkasi, Michael" userId="604489e9-c8b5-4a18-ae0d-3a3e29c44efc" providerId="ADAL" clId="{F19F6765-F9C2-2F4B-B759-1DC0051C5417}" dt="2025-05-05T18:42:31.305" v="0" actId="478"/>
-          <ac:spMkLst>
-            <pc:docMk/>
-            <pc:sldMk cId="1160241537" sldId="256"/>
-            <ac:spMk id="382" creationId="{CC033841-BB8D-857B-FA99-FFD6B744A559}"/>
-          </ac:spMkLst>
-        </pc:spChg>
-        <pc:spChg chg="del">
-          <ac:chgData name="Barkasi, Michael" userId="604489e9-c8b5-4a18-ae0d-3a3e29c44efc" providerId="ADAL" clId="{F19F6765-F9C2-2F4B-B759-1DC0051C5417}" dt="2025-05-05T18:42:31.305" v="0" actId="478"/>
-          <ac:spMkLst>
-            <pc:docMk/>
-            <pc:sldMk cId="1160241537" sldId="256"/>
-            <ac:spMk id="387" creationId="{83378D40-C98B-B342-9AD3-C6064275E58F}"/>
-          </ac:spMkLst>
-        </pc:spChg>
-        <pc:spChg chg="del">
-          <ac:chgData name="Barkasi, Michael" userId="604489e9-c8b5-4a18-ae0d-3a3e29c44efc" providerId="ADAL" clId="{F19F6765-F9C2-2F4B-B759-1DC0051C5417}" dt="2025-05-05T18:42:31.305" v="0" actId="478"/>
-          <ac:spMkLst>
-            <pc:docMk/>
-            <pc:sldMk cId="1160241537" sldId="256"/>
-            <ac:spMk id="392" creationId="{47A8D240-36A6-246F-5E31-18BBA477F933}"/>
-          </ac:spMkLst>
-        </pc:spChg>
-        <pc:grpChg chg="add del mod">
-          <ac:chgData name="Barkasi, Michael" userId="604489e9-c8b5-4a18-ae0d-3a3e29c44efc" providerId="ADAL" clId="{F19F6765-F9C2-2F4B-B759-1DC0051C5417}" dt="2025-05-05T18:42:52.205" v="2" actId="165"/>
-          <ac:grpSpMkLst>
-            <pc:docMk/>
-            <pc:sldMk cId="1160241537" sldId="256"/>
-            <ac:grpSpMk id="2" creationId="{99E59B1D-9A3B-88D2-0630-A39582C90776}"/>
-          </ac:grpSpMkLst>
-        </pc:grpChg>
-        <pc:grpChg chg="del mod topLvl">
-          <ac:chgData name="Barkasi, Michael" userId="604489e9-c8b5-4a18-ae0d-3a3e29c44efc" providerId="ADAL" clId="{F19F6765-F9C2-2F4B-B759-1DC0051C5417}" dt="2025-05-05T18:43:01.917" v="6" actId="165"/>
-          <ac:grpSpMkLst>
-            <pc:docMk/>
-            <pc:sldMk cId="1160241537" sldId="256"/>
-            <ac:grpSpMk id="3" creationId="{9CB92955-812B-32B0-44B1-9ADAA7A999B1}"/>
-          </ac:grpSpMkLst>
-        </pc:grpChg>
-        <pc:grpChg chg="mod topLvl">
-          <ac:chgData name="Barkasi, Michael" userId="604489e9-c8b5-4a18-ae0d-3a3e29c44efc" providerId="ADAL" clId="{F19F6765-F9C2-2F4B-B759-1DC0051C5417}" dt="2025-05-05T18:46:56.125" v="28" actId="1076"/>
-          <ac:grpSpMkLst>
-            <pc:docMk/>
-            <pc:sldMk cId="1160241537" sldId="256"/>
-            <ac:grpSpMk id="16" creationId="{4112BF9C-FBFD-F6FF-1DA6-8D81C6C1BDD8}"/>
-          </ac:grpSpMkLst>
-        </pc:grpChg>
-        <pc:grpChg chg="add del mod">
-          <ac:chgData name="Barkasi, Michael" userId="604489e9-c8b5-4a18-ae0d-3a3e29c44efc" providerId="ADAL" clId="{F19F6765-F9C2-2F4B-B759-1DC0051C5417}" dt="2025-05-05T18:45:18.126" v="11" actId="165"/>
-          <ac:grpSpMkLst>
-            <pc:docMk/>
-            <pc:sldMk cId="1160241537" sldId="256"/>
-            <ac:grpSpMk id="29" creationId="{9153AD00-8DE2-C198-EDC0-2E46C0B835DF}"/>
-          </ac:grpSpMkLst>
-        </pc:grpChg>
-        <pc:grpChg chg="mod">
-          <ac:chgData name="Barkasi, Michael" userId="604489e9-c8b5-4a18-ae0d-3a3e29c44efc" providerId="ADAL" clId="{F19F6765-F9C2-2F4B-B759-1DC0051C5417}" dt="2025-05-05T22:07:37.363" v="233" actId="1076"/>
-          <ac:grpSpMkLst>
-            <pc:docMk/>
-            <pc:sldMk cId="1160241537" sldId="256"/>
-            <ac:grpSpMk id="45" creationId="{4FF82988-8CD1-293B-C955-4394041791E5}"/>
-          </ac:grpSpMkLst>
-        </pc:grpChg>
-        <pc:grpChg chg="mod">
-          <ac:chgData name="Barkasi, Michael" userId="604489e9-c8b5-4a18-ae0d-3a3e29c44efc" providerId="ADAL" clId="{F19F6765-F9C2-2F4B-B759-1DC0051C5417}" dt="2025-05-05T18:50:48.756" v="88" actId="1076"/>
-          <ac:grpSpMkLst>
-            <pc:docMk/>
-            <pc:sldMk cId="1160241537" sldId="256"/>
-            <ac:grpSpMk id="68" creationId="{D3EDAE39-25BE-88A8-12BB-B59A99F9C6FB}"/>
-          </ac:grpSpMkLst>
-        </pc:grpChg>
-        <pc:grpChg chg="mod">
-          <ac:chgData name="Barkasi, Michael" userId="604489e9-c8b5-4a18-ae0d-3a3e29c44efc" providerId="ADAL" clId="{F19F6765-F9C2-2F4B-B759-1DC0051C5417}" dt="2025-05-05T22:07:37.363" v="233" actId="1076"/>
-          <ac:grpSpMkLst>
-            <pc:docMk/>
-            <pc:sldMk cId="1160241537" sldId="256"/>
-            <ac:grpSpMk id="101" creationId="{289FB2F7-62B1-6DC0-4D26-83891CDF8F1C}"/>
-          </ac:grpSpMkLst>
-        </pc:grpChg>
-        <pc:picChg chg="del mod topLvl">
-          <ac:chgData name="Barkasi, Michael" userId="604489e9-c8b5-4a18-ae0d-3a3e29c44efc" providerId="ADAL" clId="{F19F6765-F9C2-2F4B-B759-1DC0051C5417}" dt="2025-05-05T18:42:54.783" v="3" actId="478"/>
-          <ac:picMkLst>
-            <pc:docMk/>
-            <pc:sldMk cId="1160241537" sldId="256"/>
-            <ac:picMk id="11" creationId="{F35A443D-0281-D8B6-2B6A-55ECB33D07ED}"/>
-          </ac:picMkLst>
-        </pc:picChg>
-        <pc:picChg chg="del mod topLvl">
-          <ac:chgData name="Barkasi, Michael" userId="604489e9-c8b5-4a18-ae0d-3a3e29c44efc" providerId="ADAL" clId="{F19F6765-F9C2-2F4B-B759-1DC0051C5417}" dt="2025-05-05T18:42:55.730" v="4" actId="478"/>
-          <ac:picMkLst>
-            <pc:docMk/>
-            <pc:sldMk cId="1160241537" sldId="256"/>
-            <ac:picMk id="15" creationId="{5BA6DBDC-7D79-BD91-219F-0030AD690F81}"/>
-          </ac:picMkLst>
-        </pc:picChg>
-        <pc:picChg chg="mod topLvl">
-          <ac:chgData name="Barkasi, Michael" userId="604489e9-c8b5-4a18-ae0d-3a3e29c44efc" providerId="ADAL" clId="{F19F6765-F9C2-2F4B-B759-1DC0051C5417}" dt="2025-05-05T18:52:41.622" v="113" actId="1076"/>
-          <ac:picMkLst>
-            <pc:docMk/>
-            <pc:sldMk cId="1160241537" sldId="256"/>
-            <ac:picMk id="24" creationId="{63CF131A-C072-13E5-D148-6AFC2E15179D}"/>
-          </ac:picMkLst>
-        </pc:picChg>
-        <pc:picChg chg="mod">
-          <ac:chgData name="Barkasi, Michael" userId="604489e9-c8b5-4a18-ae0d-3a3e29c44efc" providerId="ADAL" clId="{F19F6765-F9C2-2F4B-B759-1DC0051C5417}" dt="2025-05-05T18:43:01.917" v="6" actId="165"/>
-          <ac:picMkLst>
-            <pc:docMk/>
-            <pc:sldMk cId="1160241537" sldId="256"/>
-            <ac:picMk id="26" creationId="{C9231AFA-391C-14C4-C56E-524D53B6A033}"/>
-          </ac:picMkLst>
-        </pc:picChg>
-        <pc:picChg chg="mod topLvl modCrop">
-          <ac:chgData name="Barkasi, Michael" userId="604489e9-c8b5-4a18-ae0d-3a3e29c44efc" providerId="ADAL" clId="{F19F6765-F9C2-2F4B-B759-1DC0051C5417}" dt="2025-05-05T22:08:00.871" v="236" actId="1076"/>
-          <ac:picMkLst>
-            <pc:docMk/>
-            <pc:sldMk cId="1160241537" sldId="256"/>
-            <ac:picMk id="31" creationId="{B89A559F-3D9B-F6E0-FB14-F38603D20325}"/>
-          </ac:picMkLst>
-        </pc:picChg>
-        <pc:picChg chg="add mod modCrop">
-          <ac:chgData name="Barkasi, Michael" userId="604489e9-c8b5-4a18-ae0d-3a3e29c44efc" providerId="ADAL" clId="{F19F6765-F9C2-2F4B-B759-1DC0051C5417}" dt="2025-05-05T22:08:00.871" v="236" actId="1076"/>
-          <ac:picMkLst>
-            <pc:docMk/>
-            <pc:sldMk cId="1160241537" sldId="256"/>
-            <ac:picMk id="34" creationId="{A19C1B91-2F0C-834D-5D19-0D9DCE67831D}"/>
-          </ac:picMkLst>
-        </pc:picChg>
-        <pc:picChg chg="mod">
-          <ac:chgData name="Barkasi, Michael" userId="604489e9-c8b5-4a18-ae0d-3a3e29c44efc" providerId="ADAL" clId="{F19F6765-F9C2-2F4B-B759-1DC0051C5417}" dt="2025-05-05T18:49:45.753" v="78"/>
-          <ac:picMkLst>
-            <pc:docMk/>
-            <pc:sldMk cId="1160241537" sldId="256"/>
-            <ac:picMk id="52" creationId="{5A60C0C9-5C59-AF4B-BD84-C5FC09133228}"/>
-          </ac:picMkLst>
-        </pc:picChg>
-        <pc:picChg chg="mod">
-          <ac:chgData name="Barkasi, Michael" userId="604489e9-c8b5-4a18-ae0d-3a3e29c44efc" providerId="ADAL" clId="{F19F6765-F9C2-2F4B-B759-1DC0051C5417}" dt="2025-05-05T18:49:45.753" v="78"/>
-          <ac:picMkLst>
-            <pc:docMk/>
-            <pc:sldMk cId="1160241537" sldId="256"/>
-            <ac:picMk id="55" creationId="{F4F16760-2EB2-347B-0E91-D5351863D39B}"/>
-          </ac:picMkLst>
-        </pc:picChg>
-        <pc:picChg chg="mod">
-          <ac:chgData name="Barkasi, Michael" userId="604489e9-c8b5-4a18-ae0d-3a3e29c44efc" providerId="ADAL" clId="{F19F6765-F9C2-2F4B-B759-1DC0051C5417}" dt="2025-05-05T18:49:45.753" v="78"/>
-          <ac:picMkLst>
-            <pc:docMk/>
-            <pc:sldMk cId="1160241537" sldId="256"/>
-            <ac:picMk id="56" creationId="{BDF45D0D-DC02-F2BA-7330-D2FD1FE6B29C}"/>
-          </ac:picMkLst>
-        </pc:picChg>
-        <pc:picChg chg="mod">
-          <ac:chgData name="Barkasi, Michael" userId="604489e9-c8b5-4a18-ae0d-3a3e29c44efc" providerId="ADAL" clId="{F19F6765-F9C2-2F4B-B759-1DC0051C5417}" dt="2025-05-05T18:49:45.753" v="78"/>
-          <ac:picMkLst>
-            <pc:docMk/>
-            <pc:sldMk cId="1160241537" sldId="256"/>
-            <ac:picMk id="57" creationId="{E6696328-4CA1-ECA6-CB89-BCC0A938875B}"/>
-          </ac:picMkLst>
-        </pc:picChg>
-        <pc:picChg chg="mod">
-          <ac:chgData name="Barkasi, Michael" userId="604489e9-c8b5-4a18-ae0d-3a3e29c44efc" providerId="ADAL" clId="{F19F6765-F9C2-2F4B-B759-1DC0051C5417}" dt="2025-05-05T18:49:45.753" v="78"/>
-          <ac:picMkLst>
-            <pc:docMk/>
-            <pc:sldMk cId="1160241537" sldId="256"/>
-            <ac:picMk id="58" creationId="{55EEB0BF-F004-366F-3C12-BFAF34BB728B}"/>
-          </ac:picMkLst>
-        </pc:picChg>
-        <pc:picChg chg="mod">
-          <ac:chgData name="Barkasi, Michael" userId="604489e9-c8b5-4a18-ae0d-3a3e29c44efc" providerId="ADAL" clId="{F19F6765-F9C2-2F4B-B759-1DC0051C5417}" dt="2025-05-05T18:49:45.753" v="78"/>
-          <ac:picMkLst>
-            <pc:docMk/>
-            <pc:sldMk cId="1160241537" sldId="256"/>
-            <ac:picMk id="59" creationId="{14628946-491E-187E-5D16-D18631C92B4A}"/>
-          </ac:picMkLst>
-        </pc:picChg>
-        <pc:picChg chg="mod">
-          <ac:chgData name="Barkasi, Michael" userId="604489e9-c8b5-4a18-ae0d-3a3e29c44efc" providerId="ADAL" clId="{F19F6765-F9C2-2F4B-B759-1DC0051C5417}" dt="2025-05-05T18:49:45.753" v="78"/>
-          <ac:picMkLst>
-            <pc:docMk/>
-            <pc:sldMk cId="1160241537" sldId="256"/>
-            <ac:picMk id="60" creationId="{720E4CD2-DC57-35AF-3CB1-B8EA8DF0D6BC}"/>
-          </ac:picMkLst>
-        </pc:picChg>
-        <pc:picChg chg="mod">
-          <ac:chgData name="Barkasi, Michael" userId="604489e9-c8b5-4a18-ae0d-3a3e29c44efc" providerId="ADAL" clId="{F19F6765-F9C2-2F4B-B759-1DC0051C5417}" dt="2025-05-05T18:49:45.753" v="78"/>
-          <ac:picMkLst>
-            <pc:docMk/>
-            <pc:sldMk cId="1160241537" sldId="256"/>
-            <ac:picMk id="62" creationId="{317A05D2-7672-B423-84F6-595EC2ABB8B3}"/>
-          </ac:picMkLst>
-        </pc:picChg>
-        <pc:picChg chg="add mod">
-          <ac:chgData name="Barkasi, Michael" userId="604489e9-c8b5-4a18-ae0d-3a3e29c44efc" providerId="ADAL" clId="{F19F6765-F9C2-2F4B-B759-1DC0051C5417}" dt="2025-05-05T18:52:45.304" v="114" actId="1076"/>
-          <ac:picMkLst>
-            <pc:docMk/>
-            <pc:sldMk cId="1160241537" sldId="256"/>
-            <ac:picMk id="67" creationId="{2AEEA982-89AD-E6DA-4767-5E12320F1BCF}"/>
-          </ac:picMkLst>
-        </pc:picChg>
-        <pc:picChg chg="mod topLvl">
-          <ac:chgData name="Barkasi, Michael" userId="604489e9-c8b5-4a18-ae0d-3a3e29c44efc" providerId="ADAL" clId="{F19F6765-F9C2-2F4B-B759-1DC0051C5417}" dt="2025-05-05T18:50:57.679" v="90" actId="165"/>
-          <ac:picMkLst>
-            <pc:docMk/>
-            <pc:sldMk cId="1160241537" sldId="256"/>
-            <ac:picMk id="74" creationId="{9F82882C-D6ED-26E2-87C1-62569E364ACF}"/>
-          </ac:picMkLst>
-        </pc:picChg>
-        <pc:picChg chg="mod topLvl">
-          <ac:chgData name="Barkasi, Michael" userId="604489e9-c8b5-4a18-ae0d-3a3e29c44efc" providerId="ADAL" clId="{F19F6765-F9C2-2F4B-B759-1DC0051C5417}" dt="2025-05-05T18:52:21.998" v="110" actId="164"/>
-          <ac:picMkLst>
-            <pc:docMk/>
-            <pc:sldMk cId="1160241537" sldId="256"/>
-            <ac:picMk id="76" creationId="{D8AE5246-E369-3C53-4D82-E6B986A1C612}"/>
-          </ac:picMkLst>
-        </pc:picChg>
-        <pc:picChg chg="mod topLvl">
-          <ac:chgData name="Barkasi, Michael" userId="604489e9-c8b5-4a18-ae0d-3a3e29c44efc" providerId="ADAL" clId="{F19F6765-F9C2-2F4B-B759-1DC0051C5417}" dt="2025-05-05T18:52:21.998" v="110" actId="164"/>
-          <ac:picMkLst>
-            <pc:docMk/>
-            <pc:sldMk cId="1160241537" sldId="256"/>
-            <ac:picMk id="79" creationId="{4EEFF05C-0B9A-4B87-4BBA-44FD43E8FE1F}"/>
-          </ac:picMkLst>
-        </pc:picChg>
-        <pc:picChg chg="mod topLvl">
-          <ac:chgData name="Barkasi, Michael" userId="604489e9-c8b5-4a18-ae0d-3a3e29c44efc" providerId="ADAL" clId="{F19F6765-F9C2-2F4B-B759-1DC0051C5417}" dt="2025-05-05T18:52:21.998" v="110" actId="164"/>
-          <ac:picMkLst>
-            <pc:docMk/>
-            <pc:sldMk cId="1160241537" sldId="256"/>
-            <ac:picMk id="81" creationId="{277D2C22-B5FC-7C56-CD57-DEF5706D8A81}"/>
-          </ac:picMkLst>
-        </pc:picChg>
-        <pc:picChg chg="mod topLvl">
-          <ac:chgData name="Barkasi, Michael" userId="604489e9-c8b5-4a18-ae0d-3a3e29c44efc" providerId="ADAL" clId="{F19F6765-F9C2-2F4B-B759-1DC0051C5417}" dt="2025-05-05T18:52:21.998" v="110" actId="164"/>
-          <ac:picMkLst>
-            <pc:docMk/>
-            <pc:sldMk cId="1160241537" sldId="256"/>
-            <ac:picMk id="82" creationId="{89CC01B9-9CE2-84B2-0602-CD869B0BD25D}"/>
-          </ac:picMkLst>
-        </pc:picChg>
-        <pc:picChg chg="mod topLvl">
-          <ac:chgData name="Barkasi, Michael" userId="604489e9-c8b5-4a18-ae0d-3a3e29c44efc" providerId="ADAL" clId="{F19F6765-F9C2-2F4B-B759-1DC0051C5417}" dt="2025-05-05T18:52:21.998" v="110" actId="164"/>
-          <ac:picMkLst>
-            <pc:docMk/>
-            <pc:sldMk cId="1160241537" sldId="256"/>
-            <ac:picMk id="84" creationId="{D96EA791-3966-80ED-A8C6-B57B6F96966B}"/>
-          </ac:picMkLst>
-        </pc:picChg>
-        <pc:picChg chg="mod topLvl">
-          <ac:chgData name="Barkasi, Michael" userId="604489e9-c8b5-4a18-ae0d-3a3e29c44efc" providerId="ADAL" clId="{F19F6765-F9C2-2F4B-B759-1DC0051C5417}" dt="2025-05-05T18:51:10.270" v="92" actId="1076"/>
-          <ac:picMkLst>
-            <pc:docMk/>
-            <pc:sldMk cId="1160241537" sldId="256"/>
-            <ac:picMk id="85" creationId="{B0544BF0-ABFB-7C23-6561-080A5D7551E8}"/>
-          </ac:picMkLst>
-        </pc:picChg>
-        <pc:picChg chg="mod topLvl">
-          <ac:chgData name="Barkasi, Michael" userId="604489e9-c8b5-4a18-ae0d-3a3e29c44efc" providerId="ADAL" clId="{F19F6765-F9C2-2F4B-B759-1DC0051C5417}" dt="2025-05-05T18:52:21.998" v="110" actId="164"/>
-          <ac:picMkLst>
-            <pc:docMk/>
-            <pc:sldMk cId="1160241537" sldId="256"/>
-            <ac:picMk id="89" creationId="{7929F190-A752-4010-3357-80CC399F85F6}"/>
-          </ac:picMkLst>
-        </pc:picChg>
-        <pc:picChg chg="mod">
-          <ac:chgData name="Barkasi, Michael" userId="604489e9-c8b5-4a18-ae0d-3a3e29c44efc" providerId="ADAL" clId="{F19F6765-F9C2-2F4B-B759-1DC0051C5417}" dt="2025-05-05T18:51:14.674" v="94" actId="1076"/>
-          <ac:picMkLst>
-            <pc:docMk/>
-            <pc:sldMk cId="1160241537" sldId="256"/>
-            <ac:picMk id="91" creationId="{1EEED4F3-8791-582C-B098-77B2253030D1}"/>
-          </ac:picMkLst>
-        </pc:picChg>
-        <pc:picChg chg="mod topLvl">
-          <ac:chgData name="Barkasi, Michael" userId="604489e9-c8b5-4a18-ae0d-3a3e29c44efc" providerId="ADAL" clId="{F19F6765-F9C2-2F4B-B759-1DC0051C5417}" dt="2025-05-05T18:51:19.364" v="96" actId="1076"/>
-          <ac:picMkLst>
-            <pc:docMk/>
-            <pc:sldMk cId="1160241537" sldId="256"/>
-            <ac:picMk id="93" creationId="{E76476C7-11C9-593E-8F53-0BF0E78CCEEA}"/>
-          </ac:picMkLst>
-        </pc:picChg>
-        <pc:picChg chg="add mod">
-          <ac:chgData name="Barkasi, Michael" userId="604489e9-c8b5-4a18-ae0d-3a3e29c44efc" providerId="ADAL" clId="{F19F6765-F9C2-2F4B-B759-1DC0051C5417}" dt="2025-05-05T18:51:46.691" v="105" actId="1076"/>
-          <ac:picMkLst>
-            <pc:docMk/>
-            <pc:sldMk cId="1160241537" sldId="256"/>
-            <ac:picMk id="94" creationId="{CC4669BA-5BD3-FC69-9B44-9E76C82D06D5}"/>
-          </ac:picMkLst>
-        </pc:picChg>
-        <pc:picChg chg="add mod">
-          <ac:chgData name="Barkasi, Michael" userId="604489e9-c8b5-4a18-ae0d-3a3e29c44efc" providerId="ADAL" clId="{F19F6765-F9C2-2F4B-B759-1DC0051C5417}" dt="2025-05-05T18:52:21.998" v="110" actId="164"/>
-          <ac:picMkLst>
-            <pc:docMk/>
-            <pc:sldMk cId="1160241537" sldId="256"/>
-            <ac:picMk id="96" creationId="{77F20841-A361-B805-210E-AAD9C91A5A12}"/>
-          </ac:picMkLst>
-        </pc:picChg>
-        <pc:picChg chg="add mod">
-          <ac:chgData name="Barkasi, Michael" userId="604489e9-c8b5-4a18-ae0d-3a3e29c44efc" providerId="ADAL" clId="{F19F6765-F9C2-2F4B-B759-1DC0051C5417}" dt="2025-05-05T18:52:21.998" v="110" actId="164"/>
-          <ac:picMkLst>
-            <pc:docMk/>
-            <pc:sldMk cId="1160241537" sldId="256"/>
-            <ac:picMk id="97" creationId="{B17B312D-3E66-1D63-A133-3E02B4198FF8}"/>
-          </ac:picMkLst>
-        </pc:picChg>
-        <pc:picChg chg="add mod">
-          <ac:chgData name="Barkasi, Michael" userId="604489e9-c8b5-4a18-ae0d-3a3e29c44efc" providerId="ADAL" clId="{F19F6765-F9C2-2F4B-B759-1DC0051C5417}" dt="2025-05-05T18:52:21.998" v="110" actId="164"/>
-          <ac:picMkLst>
-            <pc:docMk/>
-            <pc:sldMk cId="1160241537" sldId="256"/>
-            <ac:picMk id="99" creationId="{EE274D67-B5BF-6D84-6A4D-038EC6EF92C0}"/>
-          </ac:picMkLst>
-        </pc:picChg>
-        <pc:cxnChg chg="mod">
-          <ac:chgData name="Barkasi, Michael" userId="604489e9-c8b5-4a18-ae0d-3a3e29c44efc" providerId="ADAL" clId="{F19F6765-F9C2-2F4B-B759-1DC0051C5417}" dt="2025-05-05T18:43:01.917" v="6" actId="165"/>
-          <ac:cxnSpMkLst>
-            <pc:docMk/>
-            <pc:sldMk cId="1160241537" sldId="256"/>
-            <ac:cxnSpMk id="27" creationId="{C9BCD99F-272A-E300-9470-ECE18F355444}"/>
-          </ac:cxnSpMkLst>
-        </pc:cxnChg>
-        <pc:cxnChg chg="del mod topLvl">
-          <ac:chgData name="Barkasi, Michael" userId="604489e9-c8b5-4a18-ae0d-3a3e29c44efc" providerId="ADAL" clId="{F19F6765-F9C2-2F4B-B759-1DC0051C5417}" dt="2025-05-05T18:46:23.294" v="18" actId="478"/>
-          <ac:cxnSpMkLst>
-            <pc:docMk/>
-            <pc:sldMk cId="1160241537" sldId="256"/>
-            <ac:cxnSpMk id="32" creationId="{CCD59E53-ACEF-460B-B3B9-51DC861CC393}"/>
-          </ac:cxnSpMkLst>
-        </pc:cxnChg>
-        <pc:cxnChg chg="add del mod">
-          <ac:chgData name="Barkasi, Michael" userId="604489e9-c8b5-4a18-ae0d-3a3e29c44efc" providerId="ADAL" clId="{F19F6765-F9C2-2F4B-B759-1DC0051C5417}" dt="2025-05-05T18:46:38.573" v="24" actId="478"/>
-          <ac:cxnSpMkLst>
-            <pc:docMk/>
-            <pc:sldMk cId="1160241537" sldId="256"/>
-            <ac:cxnSpMk id="38" creationId="{78CCE442-8DC8-2E3D-CC94-2C8B64959F79}"/>
-          </ac:cxnSpMkLst>
-        </pc:cxnChg>
       </pc:sldChg>
     </pc:docChg>
   </pc:docChgLst>
@@ -1955,6 +1450,158 @@
       </pc:sldMasterChg>
     </pc:docChg>
   </pc:docChgLst>
+  <pc:docChgLst>
+    <pc:chgData name="Barkasi, Michael" userId="604489e9-c8b5-4a18-ae0d-3a3e29c44efc" providerId="ADAL" clId="{73BFBDAD-C491-224E-A519-A47BBDE5C6D3}"/>
+    <pc:docChg chg="modSld">
+      <pc:chgData name="Barkasi, Michael" userId="604489e9-c8b5-4a18-ae0d-3a3e29c44efc" providerId="ADAL" clId="{73BFBDAD-C491-224E-A519-A47BBDE5C6D3}" dt="2025-05-07T20:06:26.942" v="16" actId="113"/>
+      <pc:docMkLst>
+        <pc:docMk/>
+      </pc:docMkLst>
+      <pc:sldChg chg="modSp mod">
+        <pc:chgData name="Barkasi, Michael" userId="604489e9-c8b5-4a18-ae0d-3a3e29c44efc" providerId="ADAL" clId="{73BFBDAD-C491-224E-A519-A47BBDE5C6D3}" dt="2025-05-07T20:06:26.942" v="16" actId="113"/>
+        <pc:sldMkLst>
+          <pc:docMk/>
+          <pc:sldMk cId="1160241537" sldId="256"/>
+        </pc:sldMkLst>
+        <pc:spChg chg="mod">
+          <ac:chgData name="Barkasi, Michael" userId="604489e9-c8b5-4a18-ae0d-3a3e29c44efc" providerId="ADAL" clId="{73BFBDAD-C491-224E-A519-A47BBDE5C6D3}" dt="2025-05-07T20:05:59.478" v="3" actId="113"/>
+          <ac:spMkLst>
+            <pc:docMk/>
+            <pc:sldMk cId="1160241537" sldId="256"/>
+            <ac:spMk id="20" creationId="{B847D3E9-F6AC-40DB-2581-58FA1DC09D0D}"/>
+          </ac:spMkLst>
+        </pc:spChg>
+        <pc:spChg chg="mod">
+          <ac:chgData name="Barkasi, Michael" userId="604489e9-c8b5-4a18-ae0d-3a3e29c44efc" providerId="ADAL" clId="{73BFBDAD-C491-224E-A519-A47BBDE5C6D3}" dt="2025-05-07T20:06:02.223" v="5" actId="113"/>
+          <ac:spMkLst>
+            <pc:docMk/>
+            <pc:sldMk cId="1160241537" sldId="256"/>
+            <ac:spMk id="21" creationId="{9FB21508-310C-084C-90DB-4536FA70C578}"/>
+          </ac:spMkLst>
+        </pc:spChg>
+        <pc:spChg chg="mod">
+          <ac:chgData name="Barkasi, Michael" userId="604489e9-c8b5-4a18-ae0d-3a3e29c44efc" providerId="ADAL" clId="{73BFBDAD-C491-224E-A519-A47BBDE5C6D3}" dt="2025-05-07T20:06:25.337" v="15" actId="113"/>
+          <ac:spMkLst>
+            <pc:docMk/>
+            <pc:sldMk cId="1160241537" sldId="256"/>
+            <ac:spMk id="22" creationId="{0D3340DE-406D-11E2-8775-79C3AE14B727}"/>
+          </ac:spMkLst>
+        </pc:spChg>
+        <pc:spChg chg="mod">
+          <ac:chgData name="Barkasi, Michael" userId="604489e9-c8b5-4a18-ae0d-3a3e29c44efc" providerId="ADAL" clId="{73BFBDAD-C491-224E-A519-A47BBDE5C6D3}" dt="2025-05-07T20:06:15.103" v="12" actId="113"/>
+          <ac:spMkLst>
+            <pc:docMk/>
+            <pc:sldMk cId="1160241537" sldId="256"/>
+            <ac:spMk id="23" creationId="{B51C9DC5-F89E-0FC9-7E6B-863DA0C1F720}"/>
+          </ac:spMkLst>
+        </pc:spChg>
+        <pc:spChg chg="mod">
+          <ac:chgData name="Barkasi, Michael" userId="604489e9-c8b5-4a18-ae0d-3a3e29c44efc" providerId="ADAL" clId="{73BFBDAD-C491-224E-A519-A47BBDE5C6D3}" dt="2025-05-07T20:06:00.765" v="4" actId="113"/>
+          <ac:spMkLst>
+            <pc:docMk/>
+            <pc:sldMk cId="1160241537" sldId="256"/>
+            <ac:spMk id="25" creationId="{6CACE375-140F-ABBF-99B5-E90E4D3F0097}"/>
+          </ac:spMkLst>
+        </pc:spChg>
+        <pc:spChg chg="mod">
+          <ac:chgData name="Barkasi, Michael" userId="604489e9-c8b5-4a18-ae0d-3a3e29c44efc" providerId="ADAL" clId="{73BFBDAD-C491-224E-A519-A47BBDE5C6D3}" dt="2025-05-07T20:06:04.024" v="6" actId="113"/>
+          <ac:spMkLst>
+            <pc:docMk/>
+            <pc:sldMk cId="1160241537" sldId="256"/>
+            <ac:spMk id="29" creationId="{F83DFDAD-3292-5568-9297-AEBC3860A5DA}"/>
+          </ac:spMkLst>
+        </pc:spChg>
+        <pc:spChg chg="mod">
+          <ac:chgData name="Barkasi, Michael" userId="604489e9-c8b5-4a18-ae0d-3a3e29c44efc" providerId="ADAL" clId="{73BFBDAD-C491-224E-A519-A47BBDE5C6D3}" dt="2025-05-07T20:06:26.942" v="16" actId="113"/>
+          <ac:spMkLst>
+            <pc:docMk/>
+            <pc:sldMk cId="1160241537" sldId="256"/>
+            <ac:spMk id="30" creationId="{609293E5-FAEF-B4AC-3345-328CCDC32FFE}"/>
+          </ac:spMkLst>
+        </pc:spChg>
+        <pc:spChg chg="mod">
+          <ac:chgData name="Barkasi, Michael" userId="604489e9-c8b5-4a18-ae0d-3a3e29c44efc" providerId="ADAL" clId="{73BFBDAD-C491-224E-A519-A47BBDE5C6D3}" dt="2025-05-07T20:06:13.187" v="11" actId="113"/>
+          <ac:spMkLst>
+            <pc:docMk/>
+            <pc:sldMk cId="1160241537" sldId="256"/>
+            <ac:spMk id="32" creationId="{9472E4EF-A136-9742-80DD-A64970F72AEF}"/>
+          </ac:spMkLst>
+        </pc:spChg>
+        <pc:spChg chg="mod">
+          <ac:chgData name="Barkasi, Michael" userId="604489e9-c8b5-4a18-ae0d-3a3e29c44efc" providerId="ADAL" clId="{73BFBDAD-C491-224E-A519-A47BBDE5C6D3}" dt="2025-05-07T20:05:52.445" v="1" actId="113"/>
+          <ac:spMkLst>
+            <pc:docMk/>
+            <pc:sldMk cId="1160241537" sldId="256"/>
+            <ac:spMk id="35" creationId="{31E5522E-260A-87C4-320B-130EB388D970}"/>
+          </ac:spMkLst>
+        </pc:spChg>
+        <pc:spChg chg="mod">
+          <ac:chgData name="Barkasi, Michael" userId="604489e9-c8b5-4a18-ae0d-3a3e29c44efc" providerId="ADAL" clId="{73BFBDAD-C491-224E-A519-A47BBDE5C6D3}" dt="2025-05-07T20:06:23.386" v="14" actId="113"/>
+          <ac:spMkLst>
+            <pc:docMk/>
+            <pc:sldMk cId="1160241537" sldId="256"/>
+            <ac:spMk id="36" creationId="{D6CEB36B-1F87-DD10-A42A-BEC8CD516816}"/>
+          </ac:spMkLst>
+        </pc:spChg>
+        <pc:spChg chg="mod">
+          <ac:chgData name="Barkasi, Michael" userId="604489e9-c8b5-4a18-ae0d-3a3e29c44efc" providerId="ADAL" clId="{73BFBDAD-C491-224E-A519-A47BBDE5C6D3}" dt="2025-05-07T20:05:56.761" v="2" actId="113"/>
+          <ac:spMkLst>
+            <pc:docMk/>
+            <pc:sldMk cId="1160241537" sldId="256"/>
+            <ac:spMk id="37" creationId="{D961E832-5A9C-7FA5-B576-F946E195770F}"/>
+          </ac:spMkLst>
+        </pc:spChg>
+        <pc:spChg chg="mod">
+          <ac:chgData name="Barkasi, Michael" userId="604489e9-c8b5-4a18-ae0d-3a3e29c44efc" providerId="ADAL" clId="{73BFBDAD-C491-224E-A519-A47BBDE5C6D3}" dt="2025-05-07T20:06:19.530" v="13" actId="113"/>
+          <ac:spMkLst>
+            <pc:docMk/>
+            <pc:sldMk cId="1160241537" sldId="256"/>
+            <ac:spMk id="38" creationId="{9A6EB0F7-039E-DF0B-BDCE-5B7C2881181F}"/>
+          </ac:spMkLst>
+        </pc:spChg>
+        <pc:spChg chg="mod">
+          <ac:chgData name="Barkasi, Michael" userId="604489e9-c8b5-4a18-ae0d-3a3e29c44efc" providerId="ADAL" clId="{73BFBDAD-C491-224E-A519-A47BBDE5C6D3}" dt="2025-05-07T20:05:46.002" v="0" actId="113"/>
+          <ac:spMkLst>
+            <pc:docMk/>
+            <pc:sldMk cId="1160241537" sldId="256"/>
+            <ac:spMk id="39" creationId="{2C2C0C59-B88E-1A37-3301-55C9F77DF7D3}"/>
+          </ac:spMkLst>
+        </pc:spChg>
+        <pc:spChg chg="mod">
+          <ac:chgData name="Barkasi, Michael" userId="604489e9-c8b5-4a18-ae0d-3a3e29c44efc" providerId="ADAL" clId="{73BFBDAD-C491-224E-A519-A47BBDE5C6D3}" dt="2025-05-07T20:06:05.898" v="7" actId="113"/>
+          <ac:spMkLst>
+            <pc:docMk/>
+            <pc:sldMk cId="1160241537" sldId="256"/>
+            <ac:spMk id="95" creationId="{EAE47810-0E78-1D70-BB59-D061A2D94E9A}"/>
+          </ac:spMkLst>
+        </pc:spChg>
+        <pc:spChg chg="mod">
+          <ac:chgData name="Barkasi, Michael" userId="604489e9-c8b5-4a18-ae0d-3a3e29c44efc" providerId="ADAL" clId="{73BFBDAD-C491-224E-A519-A47BBDE5C6D3}" dt="2025-05-07T20:06:09.844" v="9" actId="113"/>
+          <ac:spMkLst>
+            <pc:docMk/>
+            <pc:sldMk cId="1160241537" sldId="256"/>
+            <ac:spMk id="98" creationId="{3AAC87AF-261E-ABF7-50F7-87FC51C56B51}"/>
+          </ac:spMkLst>
+        </pc:spChg>
+        <pc:spChg chg="mod">
+          <ac:chgData name="Barkasi, Michael" userId="604489e9-c8b5-4a18-ae0d-3a3e29c44efc" providerId="ADAL" clId="{73BFBDAD-C491-224E-A519-A47BBDE5C6D3}" dt="2025-05-07T20:06:11.761" v="10" actId="113"/>
+          <ac:spMkLst>
+            <pc:docMk/>
+            <pc:sldMk cId="1160241537" sldId="256"/>
+            <ac:spMk id="100" creationId="{FED3D04B-5A2C-CA5B-1D61-9DDC547AC876}"/>
+          </ac:spMkLst>
+        </pc:spChg>
+        <pc:spChg chg="mod">
+          <ac:chgData name="Barkasi, Michael" userId="604489e9-c8b5-4a18-ae0d-3a3e29c44efc" providerId="ADAL" clId="{73BFBDAD-C491-224E-A519-A47BBDE5C6D3}" dt="2025-05-07T20:06:08.055" v="8" actId="113"/>
+          <ac:spMkLst>
+            <pc:docMk/>
+            <pc:sldMk cId="1160241537" sldId="256"/>
+            <ac:spMk id="105" creationId="{FBB96981-705A-C6BA-FD25-F7B3C75652C6}"/>
+          </ac:spMkLst>
+        </pc:spChg>
+      </pc:sldChg>
+    </pc:docChg>
+  </pc:docChgLst>
 </pc:chgInfo>
 </file>
 
@@ -2089,7 +1736,7 @@
           <a:p>
             <a:fld id="{0671BF96-9467-0B49-AF35-7149D7F70E39}" type="datetimeFigureOut">
               <a:rPr lang="en-US" smtClean="0"/>
-              <a:t>5/5/25</a:t>
+              <a:t>5/7/25</a:t>
             </a:fld>
             <a:endParaRPr lang="en-US"/>
           </a:p>
@@ -2259,7 +1906,7 @@
           <a:p>
             <a:fld id="{0671BF96-9467-0B49-AF35-7149D7F70E39}" type="datetimeFigureOut">
               <a:rPr lang="en-US" smtClean="0"/>
-              <a:t>5/5/25</a:t>
+              <a:t>5/7/25</a:t>
             </a:fld>
             <a:endParaRPr lang="en-US"/>
           </a:p>
@@ -2439,7 +2086,7 @@
           <a:p>
             <a:fld id="{0671BF96-9467-0B49-AF35-7149D7F70E39}" type="datetimeFigureOut">
               <a:rPr lang="en-US" smtClean="0"/>
-              <a:t>5/5/25</a:t>
+              <a:t>5/7/25</a:t>
             </a:fld>
             <a:endParaRPr lang="en-US"/>
           </a:p>
@@ -2609,7 +2256,7 @@
           <a:p>
             <a:fld id="{0671BF96-9467-0B49-AF35-7149D7F70E39}" type="datetimeFigureOut">
               <a:rPr lang="en-US" smtClean="0"/>
-              <a:t>5/5/25</a:t>
+              <a:t>5/7/25</a:t>
             </a:fld>
             <a:endParaRPr lang="en-US"/>
           </a:p>
@@ -2855,7 +2502,7 @@
           <a:p>
             <a:fld id="{0671BF96-9467-0B49-AF35-7149D7F70E39}" type="datetimeFigureOut">
               <a:rPr lang="en-US" smtClean="0"/>
-              <a:t>5/5/25</a:t>
+              <a:t>5/7/25</a:t>
             </a:fld>
             <a:endParaRPr lang="en-US"/>
           </a:p>
@@ -3087,7 +2734,7 @@
           <a:p>
             <a:fld id="{0671BF96-9467-0B49-AF35-7149D7F70E39}" type="datetimeFigureOut">
               <a:rPr lang="en-US" smtClean="0"/>
-              <a:t>5/5/25</a:t>
+              <a:t>5/7/25</a:t>
             </a:fld>
             <a:endParaRPr lang="en-US"/>
           </a:p>
@@ -3454,7 +3101,7 @@
           <a:p>
             <a:fld id="{0671BF96-9467-0B49-AF35-7149D7F70E39}" type="datetimeFigureOut">
               <a:rPr lang="en-US" smtClean="0"/>
-              <a:t>5/5/25</a:t>
+              <a:t>5/7/25</a:t>
             </a:fld>
             <a:endParaRPr lang="en-US"/>
           </a:p>
@@ -3572,7 +3219,7 @@
           <a:p>
             <a:fld id="{0671BF96-9467-0B49-AF35-7149D7F70E39}" type="datetimeFigureOut">
               <a:rPr lang="en-US" smtClean="0"/>
-              <a:t>5/5/25</a:t>
+              <a:t>5/7/25</a:t>
             </a:fld>
             <a:endParaRPr lang="en-US"/>
           </a:p>
@@ -3667,7 +3314,7 @@
           <a:p>
             <a:fld id="{0671BF96-9467-0B49-AF35-7149D7F70E39}" type="datetimeFigureOut">
               <a:rPr lang="en-US" smtClean="0"/>
-              <a:t>5/5/25</a:t>
+              <a:t>5/7/25</a:t>
             </a:fld>
             <a:endParaRPr lang="en-US"/>
           </a:p>
@@ -3944,7 +3591,7 @@
           <a:p>
             <a:fld id="{0671BF96-9467-0B49-AF35-7149D7F70E39}" type="datetimeFigureOut">
               <a:rPr lang="en-US" smtClean="0"/>
-              <a:t>5/5/25</a:t>
+              <a:t>5/7/25</a:t>
             </a:fld>
             <a:endParaRPr lang="en-US"/>
           </a:p>
@@ -4201,7 +3848,7 @@
           <a:p>
             <a:fld id="{0671BF96-9467-0B49-AF35-7149D7F70E39}" type="datetimeFigureOut">
               <a:rPr lang="en-US" smtClean="0"/>
-              <a:t>5/5/25</a:t>
+              <a:t>5/7/25</a:t>
             </a:fld>
             <a:endParaRPr lang="en-US"/>
           </a:p>
@@ -4414,7 +4061,7 @@
             <a:fld id="{0671BF96-9467-0B49-AF35-7149D7F70E39}" type="datetimeFigureOut">
               <a:rPr lang="en-US" smtClean="0"/>
               <a:pPr/>
-              <a:t>5/5/25</a:t>
+              <a:t>5/7/25</a:t>
             </a:fld>
             <a:endParaRPr lang="en-US" dirty="0"/>
           </a:p>
@@ -4933,7 +4580,7 @@
           <a:lstStyle/>
           <a:p>
             <a:r>
-              <a:rPr lang="en-US" sz="1600" b="1" dirty="0">
+              <a:rPr lang="en-US" sz="1600" dirty="0">
                 <a:latin typeface="Arial" panose="020B0604020202020204" pitchFamily="34" charset="0"/>
                 <a:cs typeface="Arial" panose="020B0604020202020204" pitchFamily="34" charset="0"/>
               </a:rPr>
@@ -5261,7 +4908,7 @@
           <p:spPr>
             <a:xfrm>
               <a:off x="3955319" y="284730"/>
-              <a:ext cx="511679" cy="307777"/>
+              <a:ext cx="482824" cy="307777"/>
             </a:xfrm>
             <a:prstGeom prst="rect">
               <a:avLst/>
@@ -5275,7 +4922,7 @@
             <a:lstStyle/>
             <a:p>
               <a:r>
-                <a:rPr lang="en-US" sz="1400" b="1" dirty="0">
+                <a:rPr lang="en-US" sz="1400" dirty="0">
                   <a:latin typeface="Arial" panose="020B0604020202020204" pitchFamily="34" charset="0"/>
                   <a:cs typeface="Arial" panose="020B0604020202020204" pitchFamily="34" charset="0"/>
                 </a:rPr>
@@ -5299,7 +4946,7 @@
           <p:spPr>
             <a:xfrm>
               <a:off x="3955319" y="2683894"/>
-              <a:ext cx="511679" cy="307777"/>
+              <a:ext cx="482824" cy="307777"/>
             </a:xfrm>
             <a:prstGeom prst="rect">
               <a:avLst/>
@@ -5317,7 +4964,7 @@
             <a:lstStyle/>
             <a:p>
               <a:r>
-                <a:rPr lang="en-US" sz="1400" b="1" dirty="0">
+                <a:rPr lang="en-US" sz="1400" dirty="0">
                   <a:latin typeface="Arial" panose="020B0604020202020204" pitchFamily="34" charset="0"/>
                   <a:cs typeface="Arial" panose="020B0604020202020204" pitchFamily="34" charset="0"/>
                 </a:rPr>
@@ -5341,7 +4988,7 @@
           <p:spPr>
             <a:xfrm>
               <a:off x="6166519" y="288442"/>
-              <a:ext cx="641522" cy="307777"/>
+              <a:ext cx="603050" cy="307777"/>
             </a:xfrm>
             <a:prstGeom prst="rect">
               <a:avLst/>
@@ -5355,7 +5002,7 @@
             <a:lstStyle/>
             <a:p>
               <a:r>
-                <a:rPr lang="en-US" sz="1400" b="1" dirty="0">
+                <a:rPr lang="en-US" sz="1400" dirty="0">
                   <a:latin typeface="Arial" panose="020B0604020202020204" pitchFamily="34" charset="0"/>
                   <a:cs typeface="Arial" panose="020B0604020202020204" pitchFamily="34" charset="0"/>
                 </a:rPr>
@@ -5379,7 +5026,7 @@
           <p:spPr>
             <a:xfrm>
               <a:off x="6166520" y="2683893"/>
-              <a:ext cx="641522" cy="307777"/>
+              <a:ext cx="603050" cy="307777"/>
             </a:xfrm>
             <a:prstGeom prst="rect">
               <a:avLst/>
@@ -5397,7 +5044,7 @@
             <a:lstStyle/>
             <a:p>
               <a:r>
-                <a:rPr lang="en-US" sz="1400" b="1" dirty="0">
+                <a:rPr lang="en-US" sz="1400" dirty="0">
                   <a:latin typeface="Arial" panose="020B0604020202020204" pitchFamily="34" charset="0"/>
                   <a:cs typeface="Arial" panose="020B0604020202020204" pitchFamily="34" charset="0"/>
                 </a:rPr>
@@ -5437,7 +5084,7 @@
             <a:lstStyle/>
             <a:p>
               <a:r>
-                <a:rPr lang="en-US" sz="1600" b="1" dirty="0">
+                <a:rPr lang="en-US" sz="1600" dirty="0">
                   <a:latin typeface="Arial" panose="020B0604020202020204" pitchFamily="34" charset="0"/>
                   <a:cs typeface="Arial" panose="020B0604020202020204" pitchFamily="34" charset="0"/>
                 </a:rPr>
@@ -5477,7 +5124,7 @@
             <a:lstStyle/>
             <a:p>
               <a:r>
-                <a:rPr lang="en-US" sz="1600" b="1" dirty="0">
+                <a:rPr lang="en-US" sz="1600" dirty="0">
                   <a:latin typeface="Arial" panose="020B0604020202020204" pitchFamily="34" charset="0"/>
                   <a:cs typeface="Arial" panose="020B0604020202020204" pitchFamily="34" charset="0"/>
                 </a:rPr>
@@ -5840,7 +5487,7 @@
           <p:spPr>
             <a:xfrm>
               <a:off x="9126606" y="284729"/>
-              <a:ext cx="511679" cy="307777"/>
+              <a:ext cx="482824" cy="307777"/>
             </a:xfrm>
             <a:prstGeom prst="rect">
               <a:avLst/>
@@ -5858,7 +5505,7 @@
             <a:lstStyle/>
             <a:p>
               <a:r>
-                <a:rPr lang="en-US" sz="1400" b="1" dirty="0">
+                <a:rPr lang="en-US" sz="1400" dirty="0">
                   <a:latin typeface="Arial" panose="020B0604020202020204" pitchFamily="34" charset="0"/>
                   <a:cs typeface="Arial" panose="020B0604020202020204" pitchFamily="34" charset="0"/>
                 </a:rPr>
@@ -5882,7 +5529,7 @@
           <p:spPr>
             <a:xfrm>
               <a:off x="9126606" y="2683894"/>
-              <a:ext cx="511679" cy="307777"/>
+              <a:ext cx="482824" cy="307777"/>
             </a:xfrm>
             <a:prstGeom prst="rect">
               <a:avLst/>
@@ -5900,7 +5547,7 @@
             <a:lstStyle/>
             <a:p>
               <a:r>
-                <a:rPr lang="en-US" sz="1400" b="1" dirty="0">
+                <a:rPr lang="en-US" sz="1400" dirty="0">
                   <a:latin typeface="Arial" panose="020B0604020202020204" pitchFamily="34" charset="0"/>
                   <a:cs typeface="Arial" panose="020B0604020202020204" pitchFamily="34" charset="0"/>
                 </a:rPr>
@@ -5924,7 +5571,7 @@
           <p:spPr>
             <a:xfrm>
               <a:off x="11283242" y="284729"/>
-              <a:ext cx="641522" cy="307777"/>
+              <a:ext cx="603050" cy="307777"/>
             </a:xfrm>
             <a:prstGeom prst="rect">
               <a:avLst/>
@@ -5942,7 +5589,7 @@
             <a:lstStyle/>
             <a:p>
               <a:r>
-                <a:rPr lang="en-US" sz="1400" b="1" dirty="0">
+                <a:rPr lang="en-US" sz="1400" dirty="0">
                   <a:latin typeface="Arial" panose="020B0604020202020204" pitchFamily="34" charset="0"/>
                   <a:cs typeface="Arial" panose="020B0604020202020204" pitchFamily="34" charset="0"/>
                 </a:rPr>
@@ -5966,7 +5613,7 @@
           <p:spPr>
             <a:xfrm>
               <a:off x="11283243" y="2683892"/>
-              <a:ext cx="641522" cy="307777"/>
+              <a:ext cx="603050" cy="307777"/>
             </a:xfrm>
             <a:prstGeom prst="rect">
               <a:avLst/>
@@ -5984,7 +5631,7 @@
             <a:lstStyle/>
             <a:p>
               <a:r>
-                <a:rPr lang="en-US" sz="1400" b="1" dirty="0">
+                <a:rPr lang="en-US" sz="1400" dirty="0">
                   <a:latin typeface="Arial" panose="020B0604020202020204" pitchFamily="34" charset="0"/>
                   <a:cs typeface="Arial" panose="020B0604020202020204" pitchFamily="34" charset="0"/>
                 </a:rPr>
@@ -6024,7 +5671,7 @@
             <a:lstStyle/>
             <a:p>
               <a:r>
-                <a:rPr lang="en-US" sz="1600" b="1" dirty="0">
+                <a:rPr lang="en-US" sz="1600" dirty="0">
                   <a:latin typeface="Arial" panose="020B0604020202020204" pitchFamily="34" charset="0"/>
                   <a:cs typeface="Arial" panose="020B0604020202020204" pitchFamily="34" charset="0"/>
                 </a:rPr>
@@ -6064,7 +5711,7 @@
             <a:lstStyle/>
             <a:p>
               <a:r>
-                <a:rPr lang="en-US" sz="1600" b="1" dirty="0">
+                <a:rPr lang="en-US" sz="1600" dirty="0">
                   <a:latin typeface="Arial" panose="020B0604020202020204" pitchFamily="34" charset="0"/>
                   <a:cs typeface="Arial" panose="020B0604020202020204" pitchFamily="34" charset="0"/>
                 </a:rPr>
@@ -6238,7 +5885,7 @@
           <a:lstStyle/>
           <a:p>
             <a:r>
-              <a:rPr lang="en-US" sz="1400" b="1" dirty="0">
+              <a:rPr lang="en-US" sz="1400" dirty="0">
                 <a:latin typeface="Arial" panose="020B0604020202020204" pitchFamily="34" charset="0"/>
                 <a:cs typeface="Arial" panose="020B0604020202020204" pitchFamily="34" charset="0"/>
               </a:rPr>
@@ -6280,7 +5927,7 @@
           <a:lstStyle/>
           <a:p>
             <a:r>
-              <a:rPr lang="en-US" sz="1400" b="1" dirty="0">
+              <a:rPr lang="en-US" sz="1400" dirty="0">
                 <a:latin typeface="Arial" panose="020B0604020202020204" pitchFamily="34" charset="0"/>
                 <a:cs typeface="Arial" panose="020B0604020202020204" pitchFamily="34" charset="0"/>
               </a:rPr>
@@ -6304,7 +5951,7 @@
         <p:spPr>
           <a:xfrm>
             <a:off x="12746625" y="3962728"/>
-            <a:ext cx="482824" cy="307777"/>
+            <a:ext cx="453970" cy="307777"/>
           </a:xfrm>
           <a:prstGeom prst="rect">
             <a:avLst/>
@@ -6322,7 +5969,7 @@
           <a:lstStyle/>
           <a:p>
             <a:r>
-              <a:rPr lang="en-US" sz="1400" b="1" dirty="0">
+              <a:rPr lang="en-US" sz="1400" dirty="0">
                 <a:latin typeface="Arial" panose="020B0604020202020204" pitchFamily="34" charset="0"/>
                 <a:cs typeface="Arial" panose="020B0604020202020204" pitchFamily="34" charset="0"/>
               </a:rPr>
@@ -6346,7 +5993,7 @@
         <p:spPr>
           <a:xfrm>
             <a:off x="10572348" y="3962728"/>
-            <a:ext cx="482824" cy="307777"/>
+            <a:ext cx="453970" cy="307777"/>
           </a:xfrm>
           <a:prstGeom prst="rect">
             <a:avLst/>
@@ -6364,7 +6011,7 @@
           <a:lstStyle/>
           <a:p>
             <a:r>
-              <a:rPr lang="en-US" sz="1400" b="1" dirty="0">
+              <a:rPr lang="en-US" sz="1400" dirty="0">
                 <a:latin typeface="Arial" panose="020B0604020202020204" pitchFamily="34" charset="0"/>
                 <a:cs typeface="Arial" panose="020B0604020202020204" pitchFamily="34" charset="0"/>
               </a:rPr>

</xml_diff>